<commit_message>
auto / manual btn 중복 flow 정의 불가 예외처리
</commit_message>
<xml_diff>
--- a/DsDotNet/src/UnitTest/UnitTest.Engine/ImportOffice/ppt/T10_Button.pptx
+++ b/DsDotNet/src/UnitTest/UnitTest.Engine/ImportOffice/ppt/T10_Button.pptx
@@ -218,7 +218,7 @@
           <a:p>
             <a:fld id="{DD503887-5801-43A0-AEF9-041E8DDC2558}" type="datetimeFigureOut">
               <a:rPr lang="ko-KR" altLang="en-US" smtClean="0"/>
-              <a:t>2022-12-22</a:t>
+              <a:t>2022-12-28</a:t>
             </a:fld>
             <a:endParaRPr lang="ko-KR" altLang="en-US"/>
           </a:p>
@@ -395,7 +395,7 @@
           <a:p>
             <a:fld id="{95336A0E-57B1-4D4C-BD9B-2F72B5943464}" type="datetimeFigureOut">
               <a:rPr lang="ko-KR" altLang="en-US" smtClean="0"/>
-              <a:t>2022-12-22</a:t>
+              <a:t>2022-12-28</a:t>
             </a:fld>
             <a:endParaRPr lang="ko-KR" altLang="en-US"/>
           </a:p>
@@ -757,7 +757,7 @@
           <a:effectLst/>
           <a:extLst>
             <a:ext uri="{91240B29-F687-4f45-9708-019B960494DF}">
-              <a14:hiddenLine xmlns:a14="http://schemas.microsoft.com/office/drawing/2010/main" xmlns="" w="9525">
+              <a14:hiddenLine xmlns="" xmlns:a14="http://schemas.microsoft.com/office/drawing/2010/main" w="9525">
                 <a:solidFill>
                   <a:srgbClr val="000000"/>
                 </a:solidFill>
@@ -949,7 +949,7 @@
           <a:p>
             <a:fld id="{DEA6EBF0-8E22-42A7-9BEA-2AC7066E6498}" type="datetimeFigureOut">
               <a:rPr lang="ko-KR" altLang="en-US" smtClean="0"/>
-              <a:t>2022-12-22</a:t>
+              <a:t>2022-12-28</a:t>
             </a:fld>
             <a:endParaRPr lang="ko-KR" altLang="en-US"/>
           </a:p>
@@ -1267,7 +1267,7 @@
           <a:p>
             <a:fld id="{DEA6EBF0-8E22-42A7-9BEA-2AC7066E6498}" type="datetimeFigureOut">
               <a:rPr lang="ko-KR" altLang="en-US" smtClean="0"/>
-              <a:t>2022-12-22</a:t>
+              <a:t>2022-12-28</a:t>
             </a:fld>
             <a:endParaRPr lang="ko-KR" altLang="en-US"/>
           </a:p>
@@ -1755,7 +1755,7 @@
           <a:p>
             <a:fld id="{DEA6EBF0-8E22-42A7-9BEA-2AC7066E6498}" type="datetimeFigureOut">
               <a:rPr lang="ko-KR" altLang="en-US" smtClean="0"/>
-              <a:t>2022-12-22</a:t>
+              <a:t>2022-12-28</a:t>
             </a:fld>
             <a:endParaRPr lang="ko-KR" altLang="en-US"/>
           </a:p>
@@ -2124,7 +2124,7 @@
           <a:p>
             <a:fld id="{DEA6EBF0-8E22-42A7-9BEA-2AC7066E6498}" type="datetimeFigureOut">
               <a:rPr lang="ko-KR" altLang="en-US" smtClean="0"/>
-              <a:t>2022-12-22</a:t>
+              <a:t>2022-12-28</a:t>
             </a:fld>
             <a:endParaRPr lang="ko-KR" altLang="en-US"/>
           </a:p>
@@ -2279,7 +2279,7 @@
           <a:ln/>
           <a:extLst>
             <a:ext uri="{91240B29-F687-4f45-9708-019B960494DF}">
-              <a14:hiddenLine xmlns:a14="http://schemas.microsoft.com/office/drawing/2010/main" xmlns="" w="9525">
+              <a14:hiddenLine xmlns="" xmlns:a14="http://schemas.microsoft.com/office/drawing/2010/main" w="9525">
                 <a:solidFill>
                   <a:srgbClr val="000000"/>
                 </a:solidFill>
@@ -2397,7 +2397,7 @@
           <a:p>
             <a:fld id="{DEA6EBF0-8E22-42A7-9BEA-2AC7066E6498}" type="datetimeFigureOut">
               <a:rPr lang="ko-KR" altLang="en-US" smtClean="0"/>
-              <a:t>2022-12-22</a:t>
+              <a:t>2022-12-28</a:t>
             </a:fld>
             <a:endParaRPr lang="ko-KR" altLang="en-US"/>
           </a:p>
@@ -2554,7 +2554,7 @@
           <a:ln/>
           <a:extLst>
             <a:ext uri="{91240B29-F687-4f45-9708-019B960494DF}">
-              <a14:hiddenLine xmlns:a14="http://schemas.microsoft.com/office/drawing/2010/main" xmlns="" w="9525">
+              <a14:hiddenLine xmlns="" xmlns:a14="http://schemas.microsoft.com/office/drawing/2010/main" w="9525">
                 <a:solidFill>
                   <a:srgbClr val="000000"/>
                 </a:solidFill>
@@ -2682,7 +2682,7 @@
           <a:p>
             <a:fld id="{DEA6EBF0-8E22-42A7-9BEA-2AC7066E6498}" type="datetimeFigureOut">
               <a:rPr lang="ko-KR" altLang="en-US" smtClean="0"/>
-              <a:t>2022-12-22</a:t>
+              <a:t>2022-12-28</a:t>
             </a:fld>
             <a:endParaRPr lang="ko-KR" altLang="en-US"/>
           </a:p>
@@ -2800,7 +2800,7 @@
           <a:p>
             <a:fld id="{DEA6EBF0-8E22-42A7-9BEA-2AC7066E6498}" type="datetimeFigureOut">
               <a:rPr lang="ko-KR" altLang="en-US" smtClean="0"/>
-              <a:t>2022-12-22</a:t>
+              <a:t>2022-12-28</a:t>
             </a:fld>
             <a:endParaRPr lang="ko-KR" altLang="en-US"/>
           </a:p>
@@ -2955,7 +2955,7 @@
           <a:ln/>
           <a:extLst>
             <a:ext uri="{91240B29-F687-4f45-9708-019B960494DF}">
-              <a14:hiddenLine xmlns:a14="http://schemas.microsoft.com/office/drawing/2010/main" xmlns="" w="9525">
+              <a14:hiddenLine xmlns="" xmlns:a14="http://schemas.microsoft.com/office/drawing/2010/main" w="9525">
                 <a:solidFill>
                   <a:srgbClr val="000000"/>
                 </a:solidFill>
@@ -3083,7 +3083,7 @@
           <a:p>
             <a:fld id="{DEA6EBF0-8E22-42A7-9BEA-2AC7066E6498}" type="datetimeFigureOut">
               <a:rPr lang="ko-KR" altLang="en-US" smtClean="0"/>
-              <a:t>2022-12-22</a:t>
+              <a:t>2022-12-28</a:t>
             </a:fld>
             <a:endParaRPr lang="ko-KR" altLang="en-US"/>
           </a:p>
@@ -3426,7 +3426,7 @@
           <a:p>
             <a:fld id="{DEA6EBF0-8E22-42A7-9BEA-2AC7066E6498}" type="datetimeFigureOut">
               <a:rPr lang="ko-KR" altLang="en-US" smtClean="0"/>
-              <a:t>2022-12-22</a:t>
+              <a:t>2022-12-28</a:t>
             </a:fld>
             <a:endParaRPr lang="ko-KR" altLang="en-US"/>
           </a:p>
@@ -3581,7 +3581,7 @@
           <a:ln/>
           <a:extLst>
             <a:ext uri="{91240B29-F687-4f45-9708-019B960494DF}">
-              <a14:hiddenLine xmlns:a14="http://schemas.microsoft.com/office/drawing/2010/main" xmlns="" w="9525">
+              <a14:hiddenLine xmlns="" xmlns:a14="http://schemas.microsoft.com/office/drawing/2010/main" w="9525">
                 <a:solidFill>
                   <a:srgbClr val="000000"/>
                 </a:solidFill>
@@ -3765,7 +3765,7 @@
           <a:p>
             <a:fld id="{DEA6EBF0-8E22-42A7-9BEA-2AC7066E6498}" type="datetimeFigureOut">
               <a:rPr lang="ko-KR" altLang="en-US" smtClean="0"/>
-              <a:t>2022-12-22</a:t>
+              <a:t>2022-12-28</a:t>
             </a:fld>
             <a:endParaRPr lang="ko-KR" altLang="en-US"/>
           </a:p>
@@ -3920,7 +3920,7 @@
           <a:ln/>
           <a:extLst>
             <a:ext uri="{91240B29-F687-4f45-9708-019B960494DF}">
-              <a14:hiddenLine xmlns:a14="http://schemas.microsoft.com/office/drawing/2010/main" xmlns="" w="9525">
+              <a14:hiddenLine xmlns="" xmlns:a14="http://schemas.microsoft.com/office/drawing/2010/main" w="9525">
                 <a:solidFill>
                   <a:srgbClr val="000000"/>
                 </a:solidFill>
@@ -4242,7 +4242,7 @@
           <a:p>
             <a:fld id="{DEA6EBF0-8E22-42A7-9BEA-2AC7066E6498}" type="datetimeFigureOut">
               <a:rPr lang="ko-KR" altLang="en-US" smtClean="0"/>
-              <a:t>2022-12-22</a:t>
+              <a:t>2022-12-28</a:t>
             </a:fld>
             <a:endParaRPr lang="ko-KR" altLang="en-US"/>
           </a:p>
@@ -4337,7 +4337,7 @@
           <a:p>
             <a:fld id="{DEA6EBF0-8E22-42A7-9BEA-2AC7066E6498}" type="datetimeFigureOut">
               <a:rPr lang="ko-KR" altLang="en-US" smtClean="0"/>
-              <a:t>2022-12-22</a:t>
+              <a:t>2022-12-28</a:t>
             </a:fld>
             <a:endParaRPr lang="ko-KR" altLang="en-US"/>
           </a:p>
@@ -4605,7 +4605,7 @@
           <a:ln/>
           <a:extLst>
             <a:ext uri="{91240B29-F687-4f45-9708-019B960494DF}">
-              <a14:hiddenLine xmlns:a14="http://schemas.microsoft.com/office/drawing/2010/main" xmlns="" w="9525">
+              <a14:hiddenLine xmlns="" xmlns:a14="http://schemas.microsoft.com/office/drawing/2010/main" w="9525">
                 <a:solidFill>
                   <a:srgbClr val="000000"/>
                 </a:solidFill>
@@ -4804,7 +4804,7 @@
           <a:p>
             <a:fld id="{DEA6EBF0-8E22-42A7-9BEA-2AC7066E6498}" type="datetimeFigureOut">
               <a:rPr lang="ko-KR" altLang="en-US" smtClean="0"/>
-              <a:t>2022-12-22</a:t>
+              <a:t>2022-12-28</a:t>
             </a:fld>
             <a:endParaRPr lang="ko-KR" altLang="en-US"/>
           </a:p>
@@ -5117,7 +5117,7 @@
           <a:p>
             <a:fld id="{DEA6EBF0-8E22-42A7-9BEA-2AC7066E6498}" type="datetimeFigureOut">
               <a:rPr lang="ko-KR" altLang="en-US" smtClean="0"/>
-              <a:t>2022-12-22</a:t>
+              <a:t>2022-12-28</a:t>
             </a:fld>
             <a:endParaRPr lang="ko-KR" altLang="en-US"/>
           </a:p>
@@ -5387,7 +5387,7 @@
           <a:p>
             <a:fld id="{DEA6EBF0-8E22-42A7-9BEA-2AC7066E6498}" type="datetimeFigureOut">
               <a:rPr lang="ko-KR" altLang="en-US" smtClean="0"/>
-              <a:t>2022-12-22</a:t>
+              <a:t>2022-12-28</a:t>
             </a:fld>
             <a:endParaRPr lang="ko-KR" altLang="en-US"/>
           </a:p>
@@ -6480,6 +6480,64 @@
                 </a:solidFill>
               </a:rPr>
               <a:t>EMG2</a:t>
+            </a:r>
+            <a:endParaRPr lang="ko-KR" altLang="en-US" dirty="0">
+              <a:solidFill>
+                <a:schemeClr val="tx1"/>
+              </a:solidFill>
+            </a:endParaRPr>
+          </a:p>
+        </p:txBody>
+      </p:sp>
+      <p:sp>
+        <p:nvSpPr>
+          <p:cNvPr id="4" name="막힌 원호 3">
+            <a:extLst>
+              <a:ext uri="{FF2B5EF4-FFF2-40B4-BE49-F238E27FC236}">
+                <a16:creationId xmlns:a16="http://schemas.microsoft.com/office/drawing/2014/main" id="{CE9BCABB-FC0D-6949-83CC-BC1D52DA2C73}"/>
+              </a:ext>
+            </a:extLst>
+          </p:cNvPr>
+          <p:cNvSpPr/>
+          <p:nvPr/>
+        </p:nvSpPr>
+        <p:spPr>
+          <a:xfrm>
+            <a:off x="4148287" y="2448232"/>
+            <a:ext cx="1673524" cy="2212258"/>
+          </a:xfrm>
+          <a:prstGeom prst="blockArc">
+            <a:avLst/>
+          </a:prstGeom>
+        </p:spPr>
+        <p:style>
+          <a:lnRef idx="2">
+            <a:schemeClr val="accent1">
+              <a:shade val="50000"/>
+            </a:schemeClr>
+          </a:lnRef>
+          <a:fillRef idx="1">
+            <a:schemeClr val="accent1"/>
+          </a:fillRef>
+          <a:effectRef idx="0">
+            <a:schemeClr val="accent1"/>
+          </a:effectRef>
+          <a:fontRef idx="minor">
+            <a:schemeClr val="lt1"/>
+          </a:fontRef>
+        </p:style>
+        <p:txBody>
+          <a:bodyPr rtlCol="0" anchor="ctr"/>
+          <a:lstStyle/>
+          <a:p>
+            <a:pPr algn="ctr"/>
+            <a:r>
+              <a:rPr lang="en-US" altLang="ko-KR" dirty="0" err="1">
+                <a:solidFill>
+                  <a:schemeClr val="tx1"/>
+                </a:solidFill>
+              </a:rPr>
+              <a:t>AUTOMODE1</a:t>
             </a:r>
             <a:endParaRPr lang="ko-KR" altLang="en-US" dirty="0">
               <a:solidFill>

</xml_diff>